<commit_message>
Last edits on BST
</commit_message>
<xml_diff>
--- a/resources/classroom/Traversering av binære trær.pptx
+++ b/resources/classroom/Traversering av binære trær.pptx
@@ -7,11 +7,12 @@
   <p:sldIdLst>
     <p:sldId id="256" r:id="rId2"/>
     <p:sldId id="257" r:id="rId3"/>
-    <p:sldId id="258" r:id="rId4"/>
-    <p:sldId id="259" r:id="rId5"/>
-    <p:sldId id="260" r:id="rId6"/>
-    <p:sldId id="261" r:id="rId7"/>
-    <p:sldId id="262" r:id="rId8"/>
+    <p:sldId id="263" r:id="rId4"/>
+    <p:sldId id="258" r:id="rId5"/>
+    <p:sldId id="259" r:id="rId6"/>
+    <p:sldId id="260" r:id="rId7"/>
+    <p:sldId id="261" r:id="rId8"/>
+    <p:sldId id="262" r:id="rId9"/>
   </p:sldIdLst>
   <p:sldSz cx="12192000" cy="6858000"/>
   <p:notesSz cx="6858000" cy="9144000"/>
@@ -110,6 +111,11 @@
       </a:defRPr>
     </a:lvl9pPr>
   </p:defaultTextStyle>
+  <p:extLst>
+    <p:ext uri="{EFAFB233-063F-42B5-8137-9DF3F51BA10A}">
+      <p15:sldGuideLst xmlns:p15="http://schemas.microsoft.com/office/powerpoint/2012/main"/>
+    </p:ext>
+  </p:extLst>
 </p:presentation>
 </file>
 
@@ -262,7 +268,7 @@
           <a:p>
             <a:fld id="{3CADBD16-5BFB-4D9F-9646-C75D1B53BBB6}" type="datetimeFigureOut">
               <a:rPr lang="en-US" smtClean="0"/>
-              <a:t>3/25/2022</a:t>
+              <a:t>3/30/2022</a:t>
             </a:fld>
             <a:endParaRPr lang="en-US"/>
           </a:p>
@@ -462,7 +468,7 @@
           <a:p>
             <a:fld id="{3CADBD16-5BFB-4D9F-9646-C75D1B53BBB6}" type="datetimeFigureOut">
               <a:rPr lang="en-US" smtClean="0"/>
-              <a:t>3/25/2022</a:t>
+              <a:t>3/30/2022</a:t>
             </a:fld>
             <a:endParaRPr lang="en-US"/>
           </a:p>
@@ -672,7 +678,7 @@
           <a:p>
             <a:fld id="{3CADBD16-5BFB-4D9F-9646-C75D1B53BBB6}" type="datetimeFigureOut">
               <a:rPr lang="en-US" smtClean="0"/>
-              <a:t>3/25/2022</a:t>
+              <a:t>3/30/2022</a:t>
             </a:fld>
             <a:endParaRPr lang="en-US"/>
           </a:p>
@@ -872,7 +878,7 @@
           <a:p>
             <a:fld id="{3CADBD16-5BFB-4D9F-9646-C75D1B53BBB6}" type="datetimeFigureOut">
               <a:rPr lang="en-US" smtClean="0"/>
-              <a:t>3/25/2022</a:t>
+              <a:t>3/30/2022</a:t>
             </a:fld>
             <a:endParaRPr lang="en-US"/>
           </a:p>
@@ -1148,7 +1154,7 @@
           <a:p>
             <a:fld id="{3CADBD16-5BFB-4D9F-9646-C75D1B53BBB6}" type="datetimeFigureOut">
               <a:rPr lang="en-US" smtClean="0"/>
-              <a:t>3/25/2022</a:t>
+              <a:t>3/30/2022</a:t>
             </a:fld>
             <a:endParaRPr lang="en-US"/>
           </a:p>
@@ -1416,7 +1422,7 @@
           <a:p>
             <a:fld id="{3CADBD16-5BFB-4D9F-9646-C75D1B53BBB6}" type="datetimeFigureOut">
               <a:rPr lang="en-US" smtClean="0"/>
-              <a:t>3/25/2022</a:t>
+              <a:t>3/30/2022</a:t>
             </a:fld>
             <a:endParaRPr lang="en-US"/>
           </a:p>
@@ -1831,7 +1837,7 @@
           <a:p>
             <a:fld id="{3CADBD16-5BFB-4D9F-9646-C75D1B53BBB6}" type="datetimeFigureOut">
               <a:rPr lang="en-US" smtClean="0"/>
-              <a:t>3/25/2022</a:t>
+              <a:t>3/30/2022</a:t>
             </a:fld>
             <a:endParaRPr lang="en-US"/>
           </a:p>
@@ -1973,7 +1979,7 @@
           <a:p>
             <a:fld id="{3CADBD16-5BFB-4D9F-9646-C75D1B53BBB6}" type="datetimeFigureOut">
               <a:rPr lang="en-US" smtClean="0"/>
-              <a:t>3/25/2022</a:t>
+              <a:t>3/30/2022</a:t>
             </a:fld>
             <a:endParaRPr lang="en-US"/>
           </a:p>
@@ -2086,7 +2092,7 @@
           <a:p>
             <a:fld id="{3CADBD16-5BFB-4D9F-9646-C75D1B53BBB6}" type="datetimeFigureOut">
               <a:rPr lang="en-US" smtClean="0"/>
-              <a:t>3/25/2022</a:t>
+              <a:t>3/30/2022</a:t>
             </a:fld>
             <a:endParaRPr lang="en-US"/>
           </a:p>
@@ -2399,7 +2405,7 @@
           <a:p>
             <a:fld id="{3CADBD16-5BFB-4D9F-9646-C75D1B53BBB6}" type="datetimeFigureOut">
               <a:rPr lang="en-US" smtClean="0"/>
-              <a:t>3/25/2022</a:t>
+              <a:t>3/30/2022</a:t>
             </a:fld>
             <a:endParaRPr lang="en-US"/>
           </a:p>
@@ -2688,7 +2694,7 @@
           <a:p>
             <a:fld id="{3CADBD16-5BFB-4D9F-9646-C75D1B53BBB6}" type="datetimeFigureOut">
               <a:rPr lang="en-US" smtClean="0"/>
-              <a:t>3/25/2022</a:t>
+              <a:t>3/30/2022</a:t>
             </a:fld>
             <a:endParaRPr lang="en-US"/>
           </a:p>
@@ -2932,7 +2938,7 @@
             <a:fld id="{3CADBD16-5BFB-4D9F-9646-C75D1B53BBB6}" type="datetimeFigureOut">
               <a:rPr lang="en-US" smtClean="0"/>
               <a:pPr/>
-              <a:t>3/25/2022</a:t>
+              <a:t>3/30/2022</a:t>
             </a:fld>
             <a:endParaRPr lang="en-US" dirty="0"/>
           </a:p>
@@ -4170,7 +4176,7 @@
         </p:spPr>
         <p:txBody>
           <a:bodyPr anchor="t">
-            <a:normAutofit lnSpcReduction="10000"/>
+            <a:normAutofit/>
           </a:bodyPr>
           <a:lstStyle/>
           <a:p>
@@ -4229,60 +4235,6 @@
             <a:r>
               <a:rPr lang="en-GB" sz="2200" dirty="0"/>
               <a:t>Post-order</a:t>
-            </a:r>
-          </a:p>
-          <a:p>
-            <a:r>
-              <a:rPr lang="en-GB" sz="2600" dirty="0"/>
-              <a:t>Vi </a:t>
-            </a:r>
-            <a:r>
-              <a:rPr lang="en-GB" sz="2600" dirty="0" err="1"/>
-              <a:t>skal</a:t>
-            </a:r>
-            <a:r>
-              <a:rPr lang="en-GB" sz="2600" dirty="0"/>
-              <a:t> </a:t>
-            </a:r>
-            <a:r>
-              <a:rPr lang="en-GB" sz="2600" dirty="0" err="1"/>
-              <a:t>studere</a:t>
-            </a:r>
-            <a:r>
-              <a:rPr lang="en-GB" sz="2600" dirty="0"/>
-              <a:t> </a:t>
-            </a:r>
-            <a:r>
-              <a:rPr lang="en-GB" sz="2600" dirty="0" err="1"/>
-              <a:t>dybde</a:t>
-            </a:r>
-            <a:r>
-              <a:rPr lang="en-GB" sz="2600" dirty="0"/>
-              <a:t> </a:t>
-            </a:r>
-            <a:r>
-              <a:rPr lang="en-GB" sz="2600" dirty="0" err="1"/>
-              <a:t>først</a:t>
-            </a:r>
-            <a:r>
-              <a:rPr lang="en-GB" sz="2600" dirty="0"/>
-              <a:t> </a:t>
-            </a:r>
-            <a:r>
-              <a:rPr lang="en-GB" sz="2600" dirty="0" err="1"/>
-              <a:t>algoritmer</a:t>
-            </a:r>
-            <a:r>
-              <a:rPr lang="en-GB" sz="2600" dirty="0"/>
-              <a:t>, </a:t>
-            </a:r>
-            <a:r>
-              <a:rPr lang="en-GB" sz="2600" dirty="0" err="1"/>
-              <a:t>eller</a:t>
-            </a:r>
-            <a:r>
-              <a:rPr lang="en-GB" sz="2600" dirty="0"/>
-              <a:t> “Depth first”</a:t>
             </a:r>
           </a:p>
           <a:p>
@@ -4373,7 +4325,7 @@
       </p:grpSpPr>
       <p:sp useBgFill="1">
         <p:nvSpPr>
-          <p:cNvPr id="10" name="Rectangle 9">
+          <p:cNvPr id="14" name="Rectangle 9">
             <a:extLst>
               <a:ext uri="{FF2B5EF4-FFF2-40B4-BE49-F238E27FC236}">
                 <a16:creationId xmlns:a16="http://schemas.microsoft.com/office/drawing/2014/main" id="{2B97F24A-32CE-4C1C-A50D-3016B394DCFB}"/>
@@ -4436,7 +4388,7 @@
           <p:cNvPr id="2" name="Title 1">
             <a:extLst>
               <a:ext uri="{FF2B5EF4-FFF2-40B4-BE49-F238E27FC236}">
-                <a16:creationId xmlns:a16="http://schemas.microsoft.com/office/drawing/2014/main" id="{3B3A7D5B-ED97-47BA-8FD9-2F382CA2929C}"/>
+                <a16:creationId xmlns:a16="http://schemas.microsoft.com/office/drawing/2014/main" id="{5B0604B9-AE8A-4974-B5E5-E81C5A33417E}"/>
               </a:ext>
             </a:extLst>
           </p:cNvPr>
@@ -4450,7 +4402,7 @@
         <p:spPr>
           <a:xfrm>
             <a:off x="630936" y="639520"/>
-            <a:ext cx="4973068" cy="1719072"/>
+            <a:ext cx="3429000" cy="1719072"/>
           </a:xfrm>
         </p:spPr>
         <p:txBody>
@@ -4460,20 +4412,15 @@
           <a:lstStyle/>
           <a:p>
             <a:r>
-              <a:rPr lang="en-GB" sz="3800" dirty="0"/>
-              <a:t>Pre-order, in-order og post-order </a:t>
-            </a:r>
-            <a:r>
-              <a:rPr lang="en-GB" sz="3800" dirty="0" err="1"/>
-              <a:t>traversering</a:t>
-            </a:r>
-            <a:endParaRPr lang="en-GB" sz="3800" dirty="0"/>
-          </a:p>
-        </p:txBody>
-      </p:sp>
-      <p:sp>
-        <p:nvSpPr>
-          <p:cNvPr id="12" name="sketch line">
+              <a:rPr lang="en-GB" sz="5400"/>
+              <a:t>Level-order</a:t>
+            </a:r>
+          </a:p>
+        </p:txBody>
+      </p:sp>
+      <p:sp>
+        <p:nvSpPr>
+          <p:cNvPr id="15" name="sketch line">
             <a:extLst>
               <a:ext uri="{FF2B5EF4-FFF2-40B4-BE49-F238E27FC236}">
                 <a16:creationId xmlns:a16="http://schemas.microsoft.com/office/drawing/2014/main" id="{CD8B4F24-440B-49E9-B85D-733523DC064B}"/>
@@ -4749,7 +4696,7 @@
           <p:cNvPr id="3" name="Content Placeholder 2">
             <a:extLst>
               <a:ext uri="{FF2B5EF4-FFF2-40B4-BE49-F238E27FC236}">
-                <a16:creationId xmlns:a16="http://schemas.microsoft.com/office/drawing/2014/main" id="{FA9BABC8-6E9F-4B7F-A6F7-F4034BDC1BF7}"/>
+                <a16:creationId xmlns:a16="http://schemas.microsoft.com/office/drawing/2014/main" id="{3D389865-C910-4E93-977D-34DE55D4CDA5}"/>
               </a:ext>
             </a:extLst>
           </p:cNvPr>
@@ -4762,8 +4709,8 @@
         </p:nvSpPr>
         <p:spPr>
           <a:xfrm>
-            <a:off x="630935" y="2807208"/>
-            <a:ext cx="4973069" cy="3410712"/>
+            <a:off x="630936" y="2807208"/>
+            <a:ext cx="3429000" cy="3410712"/>
           </a:xfrm>
         </p:spPr>
         <p:txBody>
@@ -4773,200 +4720,21 @@
           <a:lstStyle/>
           <a:p>
             <a:r>
-              <a:rPr lang="en-GB" sz="2200" dirty="0"/>
-              <a:t>Pre-order: </a:t>
-            </a:r>
-            <a:r>
-              <a:rPr lang="en-GB" sz="2200" dirty="0">
-                <a:solidFill>
-                  <a:srgbClr val="FF0000"/>
-                </a:solidFill>
-              </a:rPr>
-              <a:t>&lt;root &gt;</a:t>
-            </a:r>
-            <a:r>
-              <a:rPr lang="en-GB" sz="2200" dirty="0"/>
-              <a:t> </a:t>
-            </a:r>
-            <a:r>
-              <a:rPr lang="en-GB" sz="2200" dirty="0">
-                <a:solidFill>
-                  <a:srgbClr val="00B050"/>
-                </a:solidFill>
-              </a:rPr>
-              <a:t>&lt;left &gt; &lt;right&gt;</a:t>
-            </a:r>
-          </a:p>
-          <a:p>
-            <a:r>
-              <a:rPr lang="en-GB" sz="2200" dirty="0"/>
-              <a:t>In-order: </a:t>
-            </a:r>
-            <a:r>
-              <a:rPr lang="en-GB" sz="2200" dirty="0">
-                <a:solidFill>
-                  <a:srgbClr val="00B050"/>
-                </a:solidFill>
-              </a:rPr>
-              <a:t>&lt;left&gt; </a:t>
-            </a:r>
-            <a:r>
-              <a:rPr lang="en-GB" sz="2200" dirty="0">
-                <a:solidFill>
-                  <a:srgbClr val="FF0000"/>
-                </a:solidFill>
-              </a:rPr>
-              <a:t>&lt;root&gt; </a:t>
-            </a:r>
-            <a:r>
-              <a:rPr lang="en-GB" sz="2200" dirty="0">
-                <a:solidFill>
-                  <a:srgbClr val="00B050"/>
-                </a:solidFill>
-              </a:rPr>
-              <a:t>&lt;right&gt;</a:t>
-            </a:r>
-          </a:p>
-          <a:p>
-            <a:r>
-              <a:rPr lang="en-GB" sz="2200" dirty="0"/>
-              <a:t>Post-order: </a:t>
-            </a:r>
-            <a:r>
-              <a:rPr lang="en-GB" sz="2200" dirty="0">
-                <a:solidFill>
-                  <a:srgbClr val="00B050"/>
-                </a:solidFill>
-              </a:rPr>
-              <a:t>&lt;left&gt; </a:t>
-            </a:r>
-            <a:r>
-              <a:rPr lang="en-GB" sz="2200" dirty="0">
-                <a:solidFill>
-                  <a:srgbClr val="FF0000"/>
-                </a:solidFill>
-              </a:rPr>
-              <a:t>&lt;right&gt; </a:t>
-            </a:r>
-            <a:r>
-              <a:rPr lang="en-GB" sz="2200" dirty="0">
-                <a:solidFill>
-                  <a:srgbClr val="00B050"/>
-                </a:solidFill>
-              </a:rPr>
-              <a:t>&lt;root&gt;</a:t>
-            </a:r>
-          </a:p>
-          <a:p>
-            <a:pPr lvl="1"/>
-            <a:r>
-              <a:rPr lang="en-GB" sz="2000" dirty="0">
-                <a:solidFill>
-                  <a:srgbClr val="00B050"/>
-                </a:solidFill>
-              </a:rPr>
-              <a:t>Left : </a:t>
-            </a:r>
-            <a:r>
-              <a:rPr lang="en-GB" sz="2000" dirty="0" err="1">
-                <a:solidFill>
-                  <a:srgbClr val="00B050"/>
-                </a:solidFill>
-              </a:rPr>
-              <a:t>Venstre</a:t>
-            </a:r>
-            <a:r>
-              <a:rPr lang="en-GB" sz="2000" dirty="0">
-                <a:solidFill>
-                  <a:srgbClr val="00B050"/>
-                </a:solidFill>
-              </a:rPr>
-              <a:t> </a:t>
-            </a:r>
-            <a:r>
-              <a:rPr lang="en-GB" sz="2000" dirty="0" err="1">
-                <a:solidFill>
-                  <a:srgbClr val="00B050"/>
-                </a:solidFill>
-              </a:rPr>
-              <a:t>subtre</a:t>
-            </a:r>
-            <a:endParaRPr lang="en-GB" sz="2000" dirty="0">
-              <a:solidFill>
-                <a:srgbClr val="00B050"/>
-              </a:solidFill>
-            </a:endParaRPr>
-          </a:p>
-          <a:p>
-            <a:pPr lvl="1"/>
-            <a:r>
-              <a:rPr lang="en-GB" sz="2000" dirty="0">
-                <a:solidFill>
-                  <a:srgbClr val="00B050"/>
-                </a:solidFill>
-              </a:rPr>
-              <a:t>Right: </a:t>
-            </a:r>
-            <a:r>
-              <a:rPr lang="en-GB" sz="2000" dirty="0" err="1">
-                <a:solidFill>
-                  <a:srgbClr val="00B050"/>
-                </a:solidFill>
-              </a:rPr>
-              <a:t>Høyre</a:t>
-            </a:r>
-            <a:r>
-              <a:rPr lang="en-GB" sz="2000" dirty="0">
-                <a:solidFill>
-                  <a:srgbClr val="00B050"/>
-                </a:solidFill>
-              </a:rPr>
-              <a:t> subtree</a:t>
-            </a:r>
-            <a:endParaRPr lang="en-GB" sz="2200" dirty="0">
-              <a:solidFill>
-                <a:srgbClr val="00B050"/>
-              </a:solidFill>
-            </a:endParaRPr>
-          </a:p>
-          <a:p>
-            <a:r>
-              <a:rPr lang="en-GB" sz="2400" dirty="0" err="1"/>
-              <a:t>Nodene</a:t>
-            </a:r>
-            <a:r>
-              <a:rPr lang="en-GB" sz="2400" dirty="0"/>
-              <a:t> </a:t>
-            </a:r>
-            <a:r>
-              <a:rPr lang="en-GB" sz="2400" dirty="0" err="1"/>
-              <a:t>besøkes</a:t>
-            </a:r>
-            <a:r>
-              <a:rPr lang="en-GB" sz="2400" dirty="0"/>
-              <a:t> </a:t>
-            </a:r>
-            <a:r>
-              <a:rPr lang="en-GB" sz="2400" dirty="0" err="1"/>
-              <a:t>rekursivt</a:t>
-            </a:r>
-            <a:r>
-              <a:rPr lang="en-GB" sz="2400" dirty="0"/>
-              <a:t> </a:t>
-            </a:r>
-            <a:r>
-              <a:rPr lang="en-GB" sz="2400" dirty="0" err="1"/>
-              <a:t>nedover</a:t>
-            </a:r>
-            <a:r>
-              <a:rPr lang="en-GB" sz="2400" dirty="0"/>
-              <a:t> i </a:t>
-            </a:r>
-            <a:r>
-              <a:rPr lang="en-GB" sz="2400" dirty="0" err="1"/>
-              <a:t>treet</a:t>
-            </a:r>
-            <a:endParaRPr lang="en-GB" sz="2400" dirty="0"/>
+              <a:rPr lang="en-GB" sz="2200"/>
+              <a:t>Hvert nivå traverseres før man går over til neste nivå</a:t>
+            </a:r>
+          </a:p>
+          <a:p>
+            <a:endParaRPr lang="en-GB" sz="2200"/>
+          </a:p>
+          <a:p>
+            <a:pPr marL="0" indent="0">
+              <a:buNone/>
+            </a:pPr>
+            <a:r>
+              <a:rPr lang="en-GB" sz="2200"/>
+              <a:t>20 – 10 – 35 – 5 – 15 – 23 – 40 – 3 – 7 - 21</a:t>
+            </a:r>
           </a:p>
         </p:txBody>
       </p:sp>
@@ -4975,7 +4743,7 @@
           <p:cNvPr id="5" name="Picture 4">
             <a:extLst>
               <a:ext uri="{FF2B5EF4-FFF2-40B4-BE49-F238E27FC236}">
-                <a16:creationId xmlns:a16="http://schemas.microsoft.com/office/drawing/2014/main" id="{4729B599-F123-4891-8101-F46011BEA183}"/>
+                <a16:creationId xmlns:a16="http://schemas.microsoft.com/office/drawing/2014/main" id="{7CB193CC-4327-4473-838B-B84FEDCEE81F}"/>
               </a:ext>
             </a:extLst>
           </p:cNvPr>
@@ -4992,8 +4760,8 @@
         </p:blipFill>
         <p:spPr>
           <a:xfrm>
-            <a:off x="6096000" y="1903284"/>
-            <a:ext cx="5604005" cy="3775902"/>
+            <a:off x="4654296" y="1103184"/>
+            <a:ext cx="6903720" cy="4651632"/>
           </a:xfrm>
           <a:prstGeom prst="rect">
             <a:avLst/>
@@ -5003,7 +4771,7 @@
     </p:spTree>
     <p:extLst>
       <p:ext uri="{BB962C8B-B14F-4D97-AF65-F5344CB8AC3E}">
-        <p14:creationId xmlns:p14="http://schemas.microsoft.com/office/powerpoint/2010/main" val="4290350195"/>
+        <p14:creationId xmlns:p14="http://schemas.microsoft.com/office/powerpoint/2010/main" val="1467659974"/>
       </p:ext>
     </p:extLst>
   </p:cSld>
@@ -5040,7 +4808,7 @@
       </p:grpSpPr>
       <p:sp useBgFill="1">
         <p:nvSpPr>
-          <p:cNvPr id="13" name="Rectangle 12">
+          <p:cNvPr id="10" name="Rectangle 9">
             <a:extLst>
               <a:ext uri="{FF2B5EF4-FFF2-40B4-BE49-F238E27FC236}">
                 <a16:creationId xmlns:a16="http://schemas.microsoft.com/office/drawing/2014/main" id="{2B97F24A-32CE-4C1C-A50D-3016B394DCFB}"/>
@@ -5103,7 +4871,7 @@
           <p:cNvPr id="2" name="Title 1">
             <a:extLst>
               <a:ext uri="{FF2B5EF4-FFF2-40B4-BE49-F238E27FC236}">
-                <a16:creationId xmlns:a16="http://schemas.microsoft.com/office/drawing/2014/main" id="{49D6FE75-9781-4E7A-9119-21421D7771E4}"/>
+                <a16:creationId xmlns:a16="http://schemas.microsoft.com/office/drawing/2014/main" id="{3B3A7D5B-ED97-47BA-8FD9-2F382CA2929C}"/>
               </a:ext>
             </a:extLst>
           </p:cNvPr>
@@ -5117,7 +4885,7 @@
         <p:spPr>
           <a:xfrm>
             <a:off x="630936" y="639520"/>
-            <a:ext cx="3429000" cy="1719072"/>
+            <a:ext cx="4973068" cy="1719072"/>
           </a:xfrm>
         </p:spPr>
         <p:txBody>
@@ -5127,15 +4895,20 @@
           <a:lstStyle/>
           <a:p>
             <a:r>
-              <a:rPr lang="en-GB" sz="5400"/>
-              <a:t>Pre-order</a:t>
-            </a:r>
-          </a:p>
-        </p:txBody>
-      </p:sp>
-      <p:sp>
-        <p:nvSpPr>
-          <p:cNvPr id="15" name="sketch line">
+              <a:rPr lang="en-GB" sz="3800" dirty="0"/>
+              <a:t>Pre-order, in-order og post-order </a:t>
+            </a:r>
+            <a:r>
+              <a:rPr lang="en-GB" sz="3800" dirty="0" err="1"/>
+              <a:t>traversering</a:t>
+            </a:r>
+            <a:endParaRPr lang="en-GB" sz="3800" dirty="0"/>
+          </a:p>
+        </p:txBody>
+      </p:sp>
+      <p:sp>
+        <p:nvSpPr>
+          <p:cNvPr id="12" name="sketch line">
             <a:extLst>
               <a:ext uri="{FF2B5EF4-FFF2-40B4-BE49-F238E27FC236}">
                 <a16:creationId xmlns:a16="http://schemas.microsoft.com/office/drawing/2014/main" id="{CD8B4F24-440B-49E9-B85D-733523DC064B}"/>
@@ -5411,7 +5184,7 @@
           <p:cNvPr id="3" name="Content Placeholder 2">
             <a:extLst>
               <a:ext uri="{FF2B5EF4-FFF2-40B4-BE49-F238E27FC236}">
-                <a16:creationId xmlns:a16="http://schemas.microsoft.com/office/drawing/2014/main" id="{58DFEA23-4448-4DD9-9C2A-40B036B3CF39}"/>
+                <a16:creationId xmlns:a16="http://schemas.microsoft.com/office/drawing/2014/main" id="{FA9BABC8-6E9F-4B7F-A6F7-F4034BDC1BF7}"/>
               </a:ext>
             </a:extLst>
           </p:cNvPr>
@@ -5424,125 +5197,220 @@
         </p:nvSpPr>
         <p:spPr>
           <a:xfrm>
-            <a:off x="630936" y="2807208"/>
-            <a:ext cx="4491280" cy="3410712"/>
+            <a:off x="630935" y="2807208"/>
+            <a:ext cx="4973069" cy="3410712"/>
           </a:xfrm>
         </p:spPr>
         <p:txBody>
           <a:bodyPr anchor="t">
-            <a:normAutofit lnSpcReduction="10000"/>
+            <a:normAutofit/>
           </a:bodyPr>
           <a:lstStyle/>
           <a:p>
-            <a:pPr marL="514350" indent="-514350">
-              <a:buFont typeface="+mj-lt"/>
-              <a:buAutoNum type="arabicPeriod"/>
-            </a:pPr>
-            <a:r>
-              <a:rPr lang="en-GB" dirty="0" err="1"/>
-              <a:t>Besøk</a:t>
-            </a:r>
-            <a:r>
-              <a:rPr lang="en-GB" dirty="0"/>
-              <a:t> rot node</a:t>
-            </a:r>
-          </a:p>
-          <a:p>
-            <a:pPr marL="514350" indent="-514350">
-              <a:buFont typeface="+mj-lt"/>
-              <a:buAutoNum type="arabicPeriod"/>
-            </a:pPr>
-            <a:r>
-              <a:rPr lang="en-GB" dirty="0" err="1"/>
-              <a:t>Besøk</a:t>
-            </a:r>
-            <a:r>
-              <a:rPr lang="en-GB" dirty="0"/>
+            <a:r>
+              <a:rPr lang="en-GB" sz="2200" dirty="0"/>
+              <a:t>Pre-order: </a:t>
+            </a:r>
+            <a:r>
+              <a:rPr lang="en-GB" sz="2200" dirty="0">
+                <a:solidFill>
+                  <a:srgbClr val="FF0000"/>
+                </a:solidFill>
+              </a:rPr>
+              <a:t>&lt;root &gt;</a:t>
+            </a:r>
+            <a:r>
+              <a:rPr lang="en-GB" sz="2200" dirty="0"/>
               <a:t> </a:t>
             </a:r>
             <a:r>
-              <a:rPr lang="en-GB" dirty="0" err="1"/>
-              <a:t>venstre</a:t>
-            </a:r>
-            <a:r>
-              <a:rPr lang="en-GB" dirty="0"/>
-              <a:t> sub-</a:t>
-            </a:r>
-            <a:r>
-              <a:rPr lang="en-GB" dirty="0" err="1"/>
-              <a:t>tre</a:t>
-            </a:r>
-            <a:endParaRPr lang="en-GB" dirty="0"/>
-          </a:p>
-          <a:p>
-            <a:pPr marL="514350" indent="-514350">
-              <a:buFont typeface="+mj-lt"/>
-              <a:buAutoNum type="arabicPeriod"/>
-            </a:pPr>
-            <a:r>
-              <a:rPr lang="en-GB" dirty="0" err="1"/>
-              <a:t>Besøk</a:t>
-            </a:r>
-            <a:r>
-              <a:rPr lang="en-GB" dirty="0"/>
+              <a:rPr lang="en-GB" sz="2200" dirty="0">
+                <a:solidFill>
+                  <a:srgbClr val="00B050"/>
+                </a:solidFill>
+              </a:rPr>
+              <a:t>&lt;left &gt; &lt;right&gt;</a:t>
+            </a:r>
+          </a:p>
+          <a:p>
+            <a:r>
+              <a:rPr lang="en-GB" sz="2200" dirty="0"/>
+              <a:t>In-order: </a:t>
+            </a:r>
+            <a:r>
+              <a:rPr lang="en-GB" sz="2200" dirty="0">
+                <a:solidFill>
+                  <a:srgbClr val="00B050"/>
+                </a:solidFill>
+              </a:rPr>
+              <a:t>&lt;left&gt; </a:t>
+            </a:r>
+            <a:r>
+              <a:rPr lang="en-GB" sz="2200" dirty="0">
+                <a:solidFill>
+                  <a:srgbClr val="FF0000"/>
+                </a:solidFill>
+              </a:rPr>
+              <a:t>&lt;root&gt; </a:t>
+            </a:r>
+            <a:r>
+              <a:rPr lang="en-GB" sz="2200" dirty="0">
+                <a:solidFill>
+                  <a:srgbClr val="00B050"/>
+                </a:solidFill>
+              </a:rPr>
+              <a:t>&lt;right&gt;</a:t>
+            </a:r>
+          </a:p>
+          <a:p>
+            <a:r>
+              <a:rPr lang="en-GB" sz="2200" dirty="0"/>
+              <a:t>Post-order: </a:t>
+            </a:r>
+            <a:r>
+              <a:rPr lang="en-GB" sz="2200" dirty="0">
+                <a:solidFill>
+                  <a:srgbClr val="00B050"/>
+                </a:solidFill>
+              </a:rPr>
+              <a:t>&lt;left&gt; </a:t>
+            </a:r>
+            <a:r>
+              <a:rPr lang="en-GB" sz="2200" dirty="0">
+                <a:solidFill>
+                  <a:srgbClr val="FF0000"/>
+                </a:solidFill>
+              </a:rPr>
+              <a:t>&lt;right&gt; </a:t>
+            </a:r>
+            <a:r>
+              <a:rPr lang="en-GB" sz="2200" dirty="0">
+                <a:solidFill>
+                  <a:srgbClr val="00B050"/>
+                </a:solidFill>
+              </a:rPr>
+              <a:t>&lt;root&gt;</a:t>
+            </a:r>
+          </a:p>
+          <a:p>
+            <a:pPr lvl="1"/>
+            <a:r>
+              <a:rPr lang="en-GB" sz="2000" dirty="0">
+                <a:solidFill>
+                  <a:srgbClr val="00B050"/>
+                </a:solidFill>
+              </a:rPr>
+              <a:t>Left : </a:t>
+            </a:r>
+            <a:r>
+              <a:rPr lang="en-GB" sz="2000" dirty="0" err="1">
+                <a:solidFill>
+                  <a:srgbClr val="00B050"/>
+                </a:solidFill>
+              </a:rPr>
+              <a:t>Venstre</a:t>
+            </a:r>
+            <a:r>
+              <a:rPr lang="en-GB" sz="2000" dirty="0">
+                <a:solidFill>
+                  <a:srgbClr val="00B050"/>
+                </a:solidFill>
+              </a:rPr>
               <a:t> </a:t>
             </a:r>
             <a:r>
-              <a:rPr lang="en-GB" dirty="0" err="1"/>
-              <a:t>høyre</a:t>
-            </a:r>
-            <a:r>
-              <a:rPr lang="en-GB" dirty="0"/>
-              <a:t> sub-</a:t>
-            </a:r>
-            <a:r>
-              <a:rPr lang="en-GB" dirty="0" err="1"/>
-              <a:t>tre</a:t>
-            </a:r>
-            <a:endParaRPr lang="en-GB" dirty="0"/>
-          </a:p>
-          <a:p>
-            <a:pPr marL="514350" indent="-514350">
-              <a:buFont typeface="+mj-lt"/>
-              <a:buAutoNum type="arabicPeriod"/>
-            </a:pPr>
-            <a:endParaRPr lang="en-GB" dirty="0"/>
-          </a:p>
-          <a:p>
-            <a:pPr marL="0" indent="0">
-              <a:buNone/>
-            </a:pPr>
-            <a:endParaRPr lang="en-GB" sz="1900" dirty="0"/>
-          </a:p>
-          <a:p>
-            <a:pPr marL="0" indent="0">
-              <a:buNone/>
-            </a:pPr>
-            <a:endParaRPr lang="en-GB" sz="1900" dirty="0"/>
-          </a:p>
-          <a:p>
-            <a:pPr marL="0" indent="0">
-              <a:buNone/>
-            </a:pPr>
-            <a:endParaRPr lang="en-GB" sz="1900" dirty="0"/>
-          </a:p>
-          <a:p>
-            <a:pPr marL="0" indent="0">
-              <a:buNone/>
-            </a:pPr>
-            <a:r>
-              <a:rPr lang="en-GB" sz="1900" dirty="0"/>
-              <a:t>20 – 10 – 5 – 7 – 3 – 15 – 35 – 23 – 21 – 40 </a:t>
-            </a:r>
+              <a:rPr lang="en-GB" sz="2000" dirty="0" err="1">
+                <a:solidFill>
+                  <a:srgbClr val="00B050"/>
+                </a:solidFill>
+              </a:rPr>
+              <a:t>subtre</a:t>
+            </a:r>
+            <a:endParaRPr lang="en-GB" sz="2000" dirty="0">
+              <a:solidFill>
+                <a:srgbClr val="00B050"/>
+              </a:solidFill>
+            </a:endParaRPr>
+          </a:p>
+          <a:p>
+            <a:pPr lvl="1"/>
+            <a:r>
+              <a:rPr lang="en-GB" sz="2000" dirty="0">
+                <a:solidFill>
+                  <a:srgbClr val="00B050"/>
+                </a:solidFill>
+              </a:rPr>
+              <a:t>Right: </a:t>
+            </a:r>
+            <a:r>
+              <a:rPr lang="en-GB" sz="2000" dirty="0" err="1">
+                <a:solidFill>
+                  <a:srgbClr val="00B050"/>
+                </a:solidFill>
+              </a:rPr>
+              <a:t>Høyre</a:t>
+            </a:r>
+            <a:r>
+              <a:rPr lang="en-GB" sz="2000" dirty="0">
+                <a:solidFill>
+                  <a:srgbClr val="00B050"/>
+                </a:solidFill>
+              </a:rPr>
+              <a:t> subtree</a:t>
+            </a:r>
+            <a:endParaRPr lang="en-GB" sz="2200" dirty="0">
+              <a:solidFill>
+                <a:srgbClr val="00B050"/>
+              </a:solidFill>
+            </a:endParaRPr>
+          </a:p>
+          <a:p>
+            <a:r>
+              <a:rPr lang="en-GB" sz="2400" dirty="0" err="1"/>
+              <a:t>Nodene</a:t>
+            </a:r>
+            <a:r>
+              <a:rPr lang="en-GB" sz="2400" dirty="0"/>
+              <a:t> </a:t>
+            </a:r>
+            <a:r>
+              <a:rPr lang="en-GB" sz="2400" dirty="0" err="1"/>
+              <a:t>besøkes</a:t>
+            </a:r>
+            <a:r>
+              <a:rPr lang="en-GB" sz="2400" dirty="0"/>
+              <a:t> </a:t>
+            </a:r>
+            <a:r>
+              <a:rPr lang="en-GB" sz="2400" dirty="0" err="1"/>
+              <a:t>rekursivt</a:t>
+            </a:r>
+            <a:r>
+              <a:rPr lang="en-GB" sz="2400" dirty="0"/>
+              <a:t> </a:t>
+            </a:r>
+            <a:r>
+              <a:rPr lang="en-GB" sz="2400" dirty="0" err="1"/>
+              <a:t>nedover</a:t>
+            </a:r>
+            <a:r>
+              <a:rPr lang="en-GB" sz="2400" dirty="0"/>
+              <a:t> i </a:t>
+            </a:r>
+            <a:r>
+              <a:rPr lang="en-GB" sz="2400" dirty="0" err="1"/>
+              <a:t>treet</a:t>
+            </a:r>
+            <a:endParaRPr lang="en-GB" sz="2400" dirty="0"/>
           </a:p>
         </p:txBody>
       </p:sp>
       <p:pic>
         <p:nvPicPr>
-          <p:cNvPr id="8" name="Picture 7">
-            <a:extLst>
-              <a:ext uri="{FF2B5EF4-FFF2-40B4-BE49-F238E27FC236}">
-                <a16:creationId xmlns:a16="http://schemas.microsoft.com/office/drawing/2014/main" id="{4A457F2F-90F3-4827-BF89-1923533131DA}"/>
+          <p:cNvPr id="5" name="Picture 4">
+            <a:extLst>
+              <a:ext uri="{FF2B5EF4-FFF2-40B4-BE49-F238E27FC236}">
+                <a16:creationId xmlns:a16="http://schemas.microsoft.com/office/drawing/2014/main" id="{4729B599-F123-4891-8101-F46011BEA183}"/>
               </a:ext>
             </a:extLst>
           </p:cNvPr>
@@ -5559,8 +5427,8 @@
         </p:blipFill>
         <p:spPr>
           <a:xfrm>
-            <a:off x="5122216" y="1103184"/>
-            <a:ext cx="6435799" cy="4336353"/>
+            <a:off x="6096000" y="1903284"/>
+            <a:ext cx="5604005" cy="3775902"/>
           </a:xfrm>
           <a:prstGeom prst="rect">
             <a:avLst/>
@@ -5570,7 +5438,7 @@
     </p:spTree>
     <p:extLst>
       <p:ext uri="{BB962C8B-B14F-4D97-AF65-F5344CB8AC3E}">
-        <p14:creationId xmlns:p14="http://schemas.microsoft.com/office/powerpoint/2010/main" val="2569512022"/>
+        <p14:creationId xmlns:p14="http://schemas.microsoft.com/office/powerpoint/2010/main" val="4290350195"/>
       </p:ext>
     </p:extLst>
   </p:cSld>
@@ -5670,7 +5538,7 @@
           <p:cNvPr id="2" name="Title 1">
             <a:extLst>
               <a:ext uri="{FF2B5EF4-FFF2-40B4-BE49-F238E27FC236}">
-                <a16:creationId xmlns:a16="http://schemas.microsoft.com/office/drawing/2014/main" id="{BB495743-7766-4D09-99E8-919CC155EE6E}"/>
+                <a16:creationId xmlns:a16="http://schemas.microsoft.com/office/drawing/2014/main" id="{49D6FE75-9781-4E7A-9119-21421D7771E4}"/>
               </a:ext>
             </a:extLst>
           </p:cNvPr>
@@ -5695,7 +5563,7 @@
           <a:p>
             <a:r>
               <a:rPr lang="en-GB" sz="5400"/>
-              <a:t>In-order</a:t>
+              <a:t>Pre-order</a:t>
             </a:r>
           </a:p>
         </p:txBody>
@@ -5978,7 +5846,7 @@
           <p:cNvPr id="3" name="Content Placeholder 2">
             <a:extLst>
               <a:ext uri="{FF2B5EF4-FFF2-40B4-BE49-F238E27FC236}">
-                <a16:creationId xmlns:a16="http://schemas.microsoft.com/office/drawing/2014/main" id="{744ADDC1-E1FE-4911-A790-C5D090CCB7D3}"/>
+                <a16:creationId xmlns:a16="http://schemas.microsoft.com/office/drawing/2014/main" id="{58DFEA23-4448-4DD9-9C2A-40B036B3CF39}"/>
               </a:ext>
             </a:extLst>
           </p:cNvPr>
@@ -5991,97 +5859,116 @@
         </p:nvSpPr>
         <p:spPr>
           <a:xfrm>
-            <a:off x="630935" y="2807208"/>
-            <a:ext cx="4407789" cy="3410712"/>
+            <a:off x="630936" y="2807208"/>
+            <a:ext cx="4491280" cy="3410712"/>
           </a:xfrm>
         </p:spPr>
         <p:txBody>
           <a:bodyPr anchor="t">
-            <a:normAutofit fontScale="92500"/>
+            <a:normAutofit lnSpcReduction="10000"/>
           </a:bodyPr>
           <a:lstStyle/>
           <a:p>
-            <a:r>
-              <a:rPr lang="en-GB" sz="2400" dirty="0" err="1"/>
+            <a:pPr marL="514350" indent="-514350">
+              <a:buFont typeface="+mj-lt"/>
+              <a:buAutoNum type="arabicPeriod"/>
+            </a:pPr>
+            <a:r>
+              <a:rPr lang="en-GB" dirty="0" err="1"/>
               <a:t>Besøk</a:t>
             </a:r>
             <a:r>
-              <a:rPr lang="en-GB" sz="2400" dirty="0"/>
+              <a:rPr lang="en-GB" dirty="0"/>
+              <a:t> rot node</a:t>
+            </a:r>
+          </a:p>
+          <a:p>
+            <a:pPr marL="514350" indent="-514350">
+              <a:buFont typeface="+mj-lt"/>
+              <a:buAutoNum type="arabicPeriod"/>
+            </a:pPr>
+            <a:r>
+              <a:rPr lang="en-GB" dirty="0" err="1"/>
+              <a:t>Besøk</a:t>
+            </a:r>
+            <a:r>
+              <a:rPr lang="en-GB" dirty="0"/>
               <a:t> </a:t>
             </a:r>
             <a:r>
-              <a:rPr lang="en-GB" sz="2400" dirty="0" err="1"/>
+              <a:rPr lang="en-GB" dirty="0" err="1"/>
               <a:t>venstre</a:t>
             </a:r>
             <a:r>
-              <a:rPr lang="en-GB" sz="2400" dirty="0"/>
+              <a:rPr lang="en-GB" dirty="0"/>
               <a:t> sub-</a:t>
             </a:r>
             <a:r>
-              <a:rPr lang="en-GB" sz="2400" dirty="0" err="1"/>
+              <a:rPr lang="en-GB" dirty="0" err="1"/>
               <a:t>tre</a:t>
             </a:r>
-            <a:endParaRPr lang="en-GB" sz="2400" dirty="0"/>
-          </a:p>
-          <a:p>
-            <a:r>
-              <a:rPr lang="en-GB" sz="2400" dirty="0" err="1"/>
+            <a:endParaRPr lang="en-GB" dirty="0"/>
+          </a:p>
+          <a:p>
+            <a:pPr marL="514350" indent="-514350">
+              <a:buFont typeface="+mj-lt"/>
+              <a:buAutoNum type="arabicPeriod"/>
+            </a:pPr>
+            <a:r>
+              <a:rPr lang="en-GB" dirty="0" err="1"/>
               <a:t>Besøk</a:t>
             </a:r>
             <a:r>
-              <a:rPr lang="en-GB" sz="2400" dirty="0"/>
-              <a:t> rot-node</a:t>
-            </a:r>
-          </a:p>
-          <a:p>
-            <a:r>
-              <a:rPr lang="en-GB" sz="2400" dirty="0" err="1"/>
-              <a:t>Besøk</a:t>
-            </a:r>
-            <a:r>
-              <a:rPr lang="en-GB" sz="2400" dirty="0"/>
+              <a:rPr lang="en-GB" dirty="0"/>
               <a:t> </a:t>
             </a:r>
             <a:r>
-              <a:rPr lang="en-GB" sz="2400" dirty="0" err="1"/>
+              <a:rPr lang="en-GB" dirty="0" err="1"/>
               <a:t>høyre</a:t>
             </a:r>
             <a:r>
-              <a:rPr lang="en-GB" sz="2400" dirty="0"/>
+              <a:rPr lang="en-GB" dirty="0"/>
               <a:t> sub-</a:t>
             </a:r>
             <a:r>
-              <a:rPr lang="en-GB" sz="2400" dirty="0" err="1"/>
+              <a:rPr lang="en-GB" dirty="0" err="1"/>
               <a:t>tre</a:t>
             </a:r>
-            <a:endParaRPr lang="en-GB" sz="2400" dirty="0"/>
-          </a:p>
-          <a:p>
-            <a:endParaRPr lang="en-GB" sz="1500" dirty="0"/>
-          </a:p>
-          <a:p>
-            <a:endParaRPr lang="en-GB" sz="1500" dirty="0"/>
-          </a:p>
-          <a:p>
-            <a:endParaRPr lang="en-GB" sz="1500" dirty="0"/>
-          </a:p>
-          <a:p>
-            <a:endParaRPr lang="en-GB" sz="1500" dirty="0"/>
-          </a:p>
-          <a:p>
-            <a:endParaRPr lang="en-GB" sz="2000" dirty="0"/>
+            <a:endParaRPr lang="en-GB" dirty="0"/>
+          </a:p>
+          <a:p>
+            <a:pPr marL="514350" indent="-514350">
+              <a:buFont typeface="+mj-lt"/>
+              <a:buAutoNum type="arabicPeriod"/>
+            </a:pPr>
+            <a:endParaRPr lang="en-GB" dirty="0"/>
           </a:p>
           <a:p>
             <a:pPr marL="0" indent="0">
               <a:buNone/>
             </a:pPr>
-            <a:r>
-              <a:rPr lang="en-GB" sz="2000" dirty="0"/>
-              <a:t>3 – 5 – 7 – 10 – 15 – 20 – 21 – 23 – 35 – 40 </a:t>
-            </a:r>
-          </a:p>
-          <a:p>
-            <a:endParaRPr lang="en-GB" sz="1500" dirty="0"/>
+            <a:endParaRPr lang="en-GB" sz="1900" dirty="0"/>
+          </a:p>
+          <a:p>
+            <a:pPr marL="0" indent="0">
+              <a:buNone/>
+            </a:pPr>
+            <a:endParaRPr lang="en-GB" sz="1900" dirty="0"/>
+          </a:p>
+          <a:p>
+            <a:pPr marL="0" indent="0">
+              <a:buNone/>
+            </a:pPr>
+            <a:endParaRPr lang="en-GB" sz="1900" dirty="0"/>
+          </a:p>
+          <a:p>
+            <a:pPr marL="0" indent="0">
+              <a:buNone/>
+            </a:pPr>
+            <a:r>
+              <a:rPr lang="en-GB" sz="1900" dirty="0"/>
+              <a:t>20 – 10 – 5 – 7 – 3 – 15 – 35 – 23 – 21 – 40 </a:t>
+            </a:r>
           </a:p>
         </p:txBody>
       </p:sp>
@@ -6090,7 +5977,7 @@
           <p:cNvPr id="8" name="Picture 7">
             <a:extLst>
               <a:ext uri="{FF2B5EF4-FFF2-40B4-BE49-F238E27FC236}">
-                <a16:creationId xmlns:a16="http://schemas.microsoft.com/office/drawing/2014/main" id="{581A109A-F95F-4930-916F-A8AE2ED240FE}"/>
+                <a16:creationId xmlns:a16="http://schemas.microsoft.com/office/drawing/2014/main" id="{4A457F2F-90F3-4827-BF89-1923533131DA}"/>
               </a:ext>
             </a:extLst>
           </p:cNvPr>
@@ -6107,8 +5994,8 @@
         </p:blipFill>
         <p:spPr>
           <a:xfrm>
-            <a:off x="5360684" y="1657350"/>
-            <a:ext cx="5884474" cy="3964878"/>
+            <a:off x="5122216" y="1103184"/>
+            <a:ext cx="6435799" cy="4336353"/>
           </a:xfrm>
           <a:prstGeom prst="rect">
             <a:avLst/>
@@ -6118,7 +6005,7 @@
     </p:spTree>
     <p:extLst>
       <p:ext uri="{BB962C8B-B14F-4D97-AF65-F5344CB8AC3E}">
-        <p14:creationId xmlns:p14="http://schemas.microsoft.com/office/powerpoint/2010/main" val="1969586942"/>
+        <p14:creationId xmlns:p14="http://schemas.microsoft.com/office/powerpoint/2010/main" val="2569512022"/>
       </p:ext>
     </p:extLst>
   </p:cSld>
@@ -6218,7 +6105,7 @@
           <p:cNvPr id="2" name="Title 1">
             <a:extLst>
               <a:ext uri="{FF2B5EF4-FFF2-40B4-BE49-F238E27FC236}">
-                <a16:creationId xmlns:a16="http://schemas.microsoft.com/office/drawing/2014/main" id="{ACD440FE-F5C7-4A68-9798-A45B1738844C}"/>
+                <a16:creationId xmlns:a16="http://schemas.microsoft.com/office/drawing/2014/main" id="{BB495743-7766-4D09-99E8-919CC155EE6E}"/>
               </a:ext>
             </a:extLst>
           </p:cNvPr>
@@ -6242,8 +6129,8 @@
           <a:lstStyle/>
           <a:p>
             <a:r>
-              <a:rPr lang="en-GB" sz="5400" dirty="0"/>
-              <a:t>Post-order</a:t>
+              <a:rPr lang="en-GB" sz="5400"/>
+              <a:t>In-order</a:t>
             </a:r>
           </a:p>
         </p:txBody>
@@ -6526,6 +6413,554 @@
           <p:cNvPr id="3" name="Content Placeholder 2">
             <a:extLst>
               <a:ext uri="{FF2B5EF4-FFF2-40B4-BE49-F238E27FC236}">
+                <a16:creationId xmlns:a16="http://schemas.microsoft.com/office/drawing/2014/main" id="{744ADDC1-E1FE-4911-A790-C5D090CCB7D3}"/>
+              </a:ext>
+            </a:extLst>
+          </p:cNvPr>
+          <p:cNvSpPr>
+            <a:spLocks noGrp="1"/>
+          </p:cNvSpPr>
+          <p:nvPr>
+            <p:ph idx="1"/>
+          </p:nvPr>
+        </p:nvSpPr>
+        <p:spPr>
+          <a:xfrm>
+            <a:off x="630935" y="2807208"/>
+            <a:ext cx="4407789" cy="3410712"/>
+          </a:xfrm>
+        </p:spPr>
+        <p:txBody>
+          <a:bodyPr anchor="t">
+            <a:normAutofit fontScale="92500"/>
+          </a:bodyPr>
+          <a:lstStyle/>
+          <a:p>
+            <a:r>
+              <a:rPr lang="en-GB" sz="2400" dirty="0" err="1"/>
+              <a:t>Besøk</a:t>
+            </a:r>
+            <a:r>
+              <a:rPr lang="en-GB" sz="2400" dirty="0"/>
+              <a:t> </a:t>
+            </a:r>
+            <a:r>
+              <a:rPr lang="en-GB" sz="2400" dirty="0" err="1"/>
+              <a:t>venstre</a:t>
+            </a:r>
+            <a:r>
+              <a:rPr lang="en-GB" sz="2400" dirty="0"/>
+              <a:t> sub-</a:t>
+            </a:r>
+            <a:r>
+              <a:rPr lang="en-GB" sz="2400" dirty="0" err="1"/>
+              <a:t>tre</a:t>
+            </a:r>
+            <a:endParaRPr lang="en-GB" sz="2400" dirty="0"/>
+          </a:p>
+          <a:p>
+            <a:r>
+              <a:rPr lang="en-GB" sz="2400" dirty="0" err="1"/>
+              <a:t>Besøk</a:t>
+            </a:r>
+            <a:r>
+              <a:rPr lang="en-GB" sz="2400" dirty="0"/>
+              <a:t> rot-node</a:t>
+            </a:r>
+          </a:p>
+          <a:p>
+            <a:r>
+              <a:rPr lang="en-GB" sz="2400" dirty="0" err="1"/>
+              <a:t>Besøk</a:t>
+            </a:r>
+            <a:r>
+              <a:rPr lang="en-GB" sz="2400" dirty="0"/>
+              <a:t> </a:t>
+            </a:r>
+            <a:r>
+              <a:rPr lang="en-GB" sz="2400" dirty="0" err="1"/>
+              <a:t>høyre</a:t>
+            </a:r>
+            <a:r>
+              <a:rPr lang="en-GB" sz="2400" dirty="0"/>
+              <a:t> sub-</a:t>
+            </a:r>
+            <a:r>
+              <a:rPr lang="en-GB" sz="2400" dirty="0" err="1"/>
+              <a:t>tre</a:t>
+            </a:r>
+            <a:endParaRPr lang="en-GB" sz="2400" dirty="0"/>
+          </a:p>
+          <a:p>
+            <a:endParaRPr lang="en-GB" sz="1500" dirty="0"/>
+          </a:p>
+          <a:p>
+            <a:endParaRPr lang="en-GB" sz="1500" dirty="0"/>
+          </a:p>
+          <a:p>
+            <a:endParaRPr lang="en-GB" sz="1500" dirty="0"/>
+          </a:p>
+          <a:p>
+            <a:endParaRPr lang="en-GB" sz="1500" dirty="0"/>
+          </a:p>
+          <a:p>
+            <a:endParaRPr lang="en-GB" sz="2000" dirty="0"/>
+          </a:p>
+          <a:p>
+            <a:pPr marL="0" indent="0">
+              <a:buNone/>
+            </a:pPr>
+            <a:r>
+              <a:rPr lang="en-GB" sz="2000" dirty="0"/>
+              <a:t>3 – 5 – 7 – 10 – 15 – 20 – 21 – 23 – 35 – 40 </a:t>
+            </a:r>
+          </a:p>
+          <a:p>
+            <a:endParaRPr lang="en-GB" sz="1500" dirty="0"/>
+          </a:p>
+        </p:txBody>
+      </p:sp>
+      <p:pic>
+        <p:nvPicPr>
+          <p:cNvPr id="8" name="Picture 7">
+            <a:extLst>
+              <a:ext uri="{FF2B5EF4-FFF2-40B4-BE49-F238E27FC236}">
+                <a16:creationId xmlns:a16="http://schemas.microsoft.com/office/drawing/2014/main" id="{581A109A-F95F-4930-916F-A8AE2ED240FE}"/>
+              </a:ext>
+            </a:extLst>
+          </p:cNvPr>
+          <p:cNvPicPr>
+            <a:picLocks noChangeAspect="1"/>
+          </p:cNvPicPr>
+          <p:nvPr/>
+        </p:nvPicPr>
+        <p:blipFill>
+          <a:blip r:embed="rId2"/>
+          <a:stretch>
+            <a:fillRect/>
+          </a:stretch>
+        </p:blipFill>
+        <p:spPr>
+          <a:xfrm>
+            <a:off x="5360684" y="1657350"/>
+            <a:ext cx="5884474" cy="3964878"/>
+          </a:xfrm>
+          <a:prstGeom prst="rect">
+            <a:avLst/>
+          </a:prstGeom>
+        </p:spPr>
+      </p:pic>
+    </p:spTree>
+    <p:extLst>
+      <p:ext uri="{BB962C8B-B14F-4D97-AF65-F5344CB8AC3E}">
+        <p14:creationId xmlns:p14="http://schemas.microsoft.com/office/powerpoint/2010/main" val="1969586942"/>
+      </p:ext>
+    </p:extLst>
+  </p:cSld>
+  <p:clrMapOvr>
+    <a:masterClrMapping/>
+  </p:clrMapOvr>
+</p:sld>
+</file>
+
+<file path=ppt/slides/slide7.xml><?xml version="1.0" encoding="utf-8"?>
+<p:sld xmlns:a="http://schemas.openxmlformats.org/drawingml/2006/main" xmlns:r="http://schemas.openxmlformats.org/officeDocument/2006/relationships" xmlns:p="http://schemas.openxmlformats.org/presentationml/2006/main">
+  <p:cSld>
+    <p:bg>
+      <p:bgPr>
+        <a:solidFill>
+          <a:schemeClr val="bg1"/>
+        </a:solidFill>
+        <a:effectLst/>
+      </p:bgPr>
+    </p:bg>
+    <p:spTree>
+      <p:nvGrpSpPr>
+        <p:cNvPr id="1" name=""/>
+        <p:cNvGrpSpPr/>
+        <p:nvPr/>
+      </p:nvGrpSpPr>
+      <p:grpSpPr>
+        <a:xfrm>
+          <a:off x="0" y="0"/>
+          <a:ext cx="0" cy="0"/>
+          <a:chOff x="0" y="0"/>
+          <a:chExt cx="0" cy="0"/>
+        </a:xfrm>
+      </p:grpSpPr>
+      <p:sp useBgFill="1">
+        <p:nvSpPr>
+          <p:cNvPr id="13" name="Rectangle 12">
+            <a:extLst>
+              <a:ext uri="{FF2B5EF4-FFF2-40B4-BE49-F238E27FC236}">
+                <a16:creationId xmlns:a16="http://schemas.microsoft.com/office/drawing/2014/main" id="{2B97F24A-32CE-4C1C-A50D-3016B394DCFB}"/>
+              </a:ext>
+              <a:ext uri="{C183D7F6-B498-43B3-948B-1728B52AA6E4}">
+                <adec:decorative xmlns:adec="http://schemas.microsoft.com/office/drawing/2017/decorative" val="1"/>
+              </a:ext>
+            </a:extLst>
+          </p:cNvPr>
+          <p:cNvSpPr>
+            <a:spLocks noGrp="1" noRot="1" noChangeAspect="1" noMove="1" noResize="1" noEditPoints="1" noAdjustHandles="1" noChangeArrowheads="1" noChangeShapeType="1" noTextEdit="1"/>
+          </p:cNvSpPr>
+          <p:nvPr>
+            <p:extLst>
+              <p:ext uri="{386F3935-93C4-4BCD-93E2-E3B085C9AB24}">
+                <p16:designElem xmlns:p16="http://schemas.microsoft.com/office/powerpoint/2015/main" val="1"/>
+              </p:ext>
+            </p:extLst>
+          </p:nvPr>
+        </p:nvSpPr>
+        <p:spPr>
+          <a:xfrm>
+            <a:off x="0" y="0"/>
+            <a:ext cx="12192000" cy="6858000"/>
+          </a:xfrm>
+          <a:prstGeom prst="rect">
+            <a:avLst/>
+          </a:prstGeom>
+          <a:ln>
+            <a:noFill/>
+          </a:ln>
+        </p:spPr>
+        <p:style>
+          <a:lnRef idx="2">
+            <a:schemeClr val="accent1">
+              <a:shade val="50000"/>
+            </a:schemeClr>
+          </a:lnRef>
+          <a:fillRef idx="1">
+            <a:schemeClr val="accent1"/>
+          </a:fillRef>
+          <a:effectRef idx="0">
+            <a:schemeClr val="accent1"/>
+          </a:effectRef>
+          <a:fontRef idx="minor">
+            <a:schemeClr val="lt1"/>
+          </a:fontRef>
+        </p:style>
+        <p:txBody>
+          <a:bodyPr rtlCol="0" anchor="ctr"/>
+          <a:lstStyle/>
+          <a:p>
+            <a:pPr algn="ctr"/>
+            <a:endParaRPr lang="en-US"/>
+          </a:p>
+        </p:txBody>
+      </p:sp>
+      <p:sp>
+        <p:nvSpPr>
+          <p:cNvPr id="2" name="Title 1">
+            <a:extLst>
+              <a:ext uri="{FF2B5EF4-FFF2-40B4-BE49-F238E27FC236}">
+                <a16:creationId xmlns:a16="http://schemas.microsoft.com/office/drawing/2014/main" id="{ACD440FE-F5C7-4A68-9798-A45B1738844C}"/>
+              </a:ext>
+            </a:extLst>
+          </p:cNvPr>
+          <p:cNvSpPr>
+            <a:spLocks noGrp="1"/>
+          </p:cNvSpPr>
+          <p:nvPr>
+            <p:ph type="title"/>
+          </p:nvPr>
+        </p:nvSpPr>
+        <p:spPr>
+          <a:xfrm>
+            <a:off x="630936" y="639520"/>
+            <a:ext cx="3429000" cy="1719072"/>
+          </a:xfrm>
+        </p:spPr>
+        <p:txBody>
+          <a:bodyPr anchor="b">
+            <a:normAutofit/>
+          </a:bodyPr>
+          <a:lstStyle/>
+          <a:p>
+            <a:r>
+              <a:rPr lang="en-GB" sz="5400" dirty="0"/>
+              <a:t>Post-order</a:t>
+            </a:r>
+          </a:p>
+        </p:txBody>
+      </p:sp>
+      <p:sp>
+        <p:nvSpPr>
+          <p:cNvPr id="15" name="sketch line">
+            <a:extLst>
+              <a:ext uri="{FF2B5EF4-FFF2-40B4-BE49-F238E27FC236}">
+                <a16:creationId xmlns:a16="http://schemas.microsoft.com/office/drawing/2014/main" id="{CD8B4F24-440B-49E9-B85D-733523DC064B}"/>
+              </a:ext>
+              <a:ext uri="{C183D7F6-B498-43B3-948B-1728B52AA6E4}">
+                <adec:decorative xmlns:adec="http://schemas.microsoft.com/office/drawing/2017/decorative" val="1"/>
+              </a:ext>
+            </a:extLst>
+          </p:cNvPr>
+          <p:cNvSpPr>
+            <a:spLocks noGrp="1" noRot="1" noChangeAspect="1" noMove="1" noResize="1" noEditPoints="1" noAdjustHandles="1" noChangeArrowheads="1" noChangeShapeType="1" noTextEdit="1"/>
+          </p:cNvSpPr>
+          <p:nvPr>
+            <p:extLst>
+              <p:ext uri="{386F3935-93C4-4BCD-93E2-E3B085C9AB24}">
+                <p16:designElem xmlns:p16="http://schemas.microsoft.com/office/powerpoint/2015/main" val="1"/>
+              </p:ext>
+            </p:extLst>
+          </p:nvPr>
+        </p:nvSpPr>
+        <p:spPr>
+          <a:xfrm>
+            <a:off x="643278" y="2573756"/>
+            <a:ext cx="3255095" cy="18288"/>
+          </a:xfrm>
+          <a:custGeom>
+            <a:avLst/>
+            <a:gdLst>
+              <a:gd name="connsiteX0" fmla="*/ 0 w 3255095"/>
+              <a:gd name="connsiteY0" fmla="*/ 0 h 18288"/>
+              <a:gd name="connsiteX1" fmla="*/ 618468 w 3255095"/>
+              <a:gd name="connsiteY1" fmla="*/ 0 h 18288"/>
+              <a:gd name="connsiteX2" fmla="*/ 1269487 w 3255095"/>
+              <a:gd name="connsiteY2" fmla="*/ 0 h 18288"/>
+              <a:gd name="connsiteX3" fmla="*/ 1953057 w 3255095"/>
+              <a:gd name="connsiteY3" fmla="*/ 0 h 18288"/>
+              <a:gd name="connsiteX4" fmla="*/ 2636627 w 3255095"/>
+              <a:gd name="connsiteY4" fmla="*/ 0 h 18288"/>
+              <a:gd name="connsiteX5" fmla="*/ 3255095 w 3255095"/>
+              <a:gd name="connsiteY5" fmla="*/ 0 h 18288"/>
+              <a:gd name="connsiteX6" fmla="*/ 3255095 w 3255095"/>
+              <a:gd name="connsiteY6" fmla="*/ 18288 h 18288"/>
+              <a:gd name="connsiteX7" fmla="*/ 2538974 w 3255095"/>
+              <a:gd name="connsiteY7" fmla="*/ 18288 h 18288"/>
+              <a:gd name="connsiteX8" fmla="*/ 1822853 w 3255095"/>
+              <a:gd name="connsiteY8" fmla="*/ 18288 h 18288"/>
+              <a:gd name="connsiteX9" fmla="*/ 1171834 w 3255095"/>
+              <a:gd name="connsiteY9" fmla="*/ 18288 h 18288"/>
+              <a:gd name="connsiteX10" fmla="*/ 0 w 3255095"/>
+              <a:gd name="connsiteY10" fmla="*/ 18288 h 18288"/>
+              <a:gd name="connsiteX11" fmla="*/ 0 w 3255095"/>
+              <a:gd name="connsiteY11" fmla="*/ 0 h 18288"/>
+            </a:gdLst>
+            <a:ahLst/>
+            <a:cxnLst>
+              <a:cxn ang="0">
+                <a:pos x="connsiteX0" y="connsiteY0"/>
+              </a:cxn>
+              <a:cxn ang="0">
+                <a:pos x="connsiteX1" y="connsiteY1"/>
+              </a:cxn>
+              <a:cxn ang="0">
+                <a:pos x="connsiteX2" y="connsiteY2"/>
+              </a:cxn>
+              <a:cxn ang="0">
+                <a:pos x="connsiteX3" y="connsiteY3"/>
+              </a:cxn>
+              <a:cxn ang="0">
+                <a:pos x="connsiteX4" y="connsiteY4"/>
+              </a:cxn>
+              <a:cxn ang="0">
+                <a:pos x="connsiteX5" y="connsiteY5"/>
+              </a:cxn>
+              <a:cxn ang="0">
+                <a:pos x="connsiteX6" y="connsiteY6"/>
+              </a:cxn>
+              <a:cxn ang="0">
+                <a:pos x="connsiteX7" y="connsiteY7"/>
+              </a:cxn>
+              <a:cxn ang="0">
+                <a:pos x="connsiteX8" y="connsiteY8"/>
+              </a:cxn>
+              <a:cxn ang="0">
+                <a:pos x="connsiteX9" y="connsiteY9"/>
+              </a:cxn>
+              <a:cxn ang="0">
+                <a:pos x="connsiteX10" y="connsiteY10"/>
+              </a:cxn>
+              <a:cxn ang="0">
+                <a:pos x="connsiteX11" y="connsiteY11"/>
+              </a:cxn>
+            </a:cxnLst>
+            <a:rect l="l" t="t" r="r" b="b"/>
+            <a:pathLst>
+              <a:path w="3255095" h="18288" fill="none" extrusionOk="0">
+                <a:moveTo>
+                  <a:pt x="0" y="0"/>
+                </a:moveTo>
+                <a:cubicBezTo>
+                  <a:pt x="240201" y="-22123"/>
+                  <a:pt x="462021" y="-19623"/>
+                  <a:pt x="618468" y="0"/>
+                </a:cubicBezTo>
+                <a:cubicBezTo>
+                  <a:pt x="774915" y="19623"/>
+                  <a:pt x="974734" y="2035"/>
+                  <a:pt x="1269487" y="0"/>
+                </a:cubicBezTo>
+                <a:cubicBezTo>
+                  <a:pt x="1564240" y="-2035"/>
+                  <a:pt x="1733579" y="10639"/>
+                  <a:pt x="1953057" y="0"/>
+                </a:cubicBezTo>
+                <a:cubicBezTo>
+                  <a:pt x="2172535" y="-10639"/>
+                  <a:pt x="2453962" y="14018"/>
+                  <a:pt x="2636627" y="0"/>
+                </a:cubicBezTo>
+                <a:cubicBezTo>
+                  <a:pt x="2819292" y="-14018"/>
+                  <a:pt x="3121375" y="5399"/>
+                  <a:pt x="3255095" y="0"/>
+                </a:cubicBezTo>
+                <a:cubicBezTo>
+                  <a:pt x="3254386" y="8157"/>
+                  <a:pt x="3254682" y="12125"/>
+                  <a:pt x="3255095" y="18288"/>
+                </a:cubicBezTo>
+                <a:cubicBezTo>
+                  <a:pt x="3088545" y="23203"/>
+                  <a:pt x="2687475" y="7419"/>
+                  <a:pt x="2538974" y="18288"/>
+                </a:cubicBezTo>
+                <a:cubicBezTo>
+                  <a:pt x="2390473" y="29157"/>
+                  <a:pt x="2137381" y="-8959"/>
+                  <a:pt x="1822853" y="18288"/>
+                </a:cubicBezTo>
+                <a:cubicBezTo>
+                  <a:pt x="1508325" y="45535"/>
+                  <a:pt x="1466437" y="20385"/>
+                  <a:pt x="1171834" y="18288"/>
+                </a:cubicBezTo>
+                <a:cubicBezTo>
+                  <a:pt x="877231" y="16191"/>
+                  <a:pt x="561097" y="37643"/>
+                  <a:pt x="0" y="18288"/>
+                </a:cubicBezTo>
+                <a:cubicBezTo>
+                  <a:pt x="-46" y="12483"/>
+                  <a:pt x="-203" y="6491"/>
+                  <a:pt x="0" y="0"/>
+                </a:cubicBezTo>
+                <a:close/>
+              </a:path>
+              <a:path w="3255095" h="18288" stroke="0" extrusionOk="0">
+                <a:moveTo>
+                  <a:pt x="0" y="0"/>
+                </a:moveTo>
+                <a:cubicBezTo>
+                  <a:pt x="291965" y="19429"/>
+                  <a:pt x="363155" y="8568"/>
+                  <a:pt x="618468" y="0"/>
+                </a:cubicBezTo>
+                <a:cubicBezTo>
+                  <a:pt x="873781" y="-8568"/>
+                  <a:pt x="904459" y="-19505"/>
+                  <a:pt x="1171834" y="0"/>
+                </a:cubicBezTo>
+                <a:cubicBezTo>
+                  <a:pt x="1439209" y="19505"/>
+                  <a:pt x="1744369" y="9790"/>
+                  <a:pt x="1887955" y="0"/>
+                </a:cubicBezTo>
+                <a:cubicBezTo>
+                  <a:pt x="2031541" y="-9790"/>
+                  <a:pt x="2346378" y="21240"/>
+                  <a:pt x="2506423" y="0"/>
+                </a:cubicBezTo>
+                <a:cubicBezTo>
+                  <a:pt x="2666468" y="-21240"/>
+                  <a:pt x="2990257" y="30414"/>
+                  <a:pt x="3255095" y="0"/>
+                </a:cubicBezTo>
+                <a:cubicBezTo>
+                  <a:pt x="3254831" y="4493"/>
+                  <a:pt x="3255479" y="9472"/>
+                  <a:pt x="3255095" y="18288"/>
+                </a:cubicBezTo>
+                <a:cubicBezTo>
+                  <a:pt x="3120743" y="16690"/>
+                  <a:pt x="2759628" y="42462"/>
+                  <a:pt x="2604076" y="18288"/>
+                </a:cubicBezTo>
+                <a:cubicBezTo>
+                  <a:pt x="2448524" y="-5886"/>
+                  <a:pt x="2184336" y="19599"/>
+                  <a:pt x="1887955" y="18288"/>
+                </a:cubicBezTo>
+                <a:cubicBezTo>
+                  <a:pt x="1591574" y="16977"/>
+                  <a:pt x="1548845" y="6870"/>
+                  <a:pt x="1334589" y="18288"/>
+                </a:cubicBezTo>
+                <a:cubicBezTo>
+                  <a:pt x="1120333" y="29706"/>
+                  <a:pt x="996014" y="9662"/>
+                  <a:pt x="683570" y="18288"/>
+                </a:cubicBezTo>
+                <a:cubicBezTo>
+                  <a:pt x="371126" y="26914"/>
+                  <a:pt x="198687" y="16167"/>
+                  <a:pt x="0" y="18288"/>
+                </a:cubicBezTo>
+                <a:cubicBezTo>
+                  <a:pt x="843" y="9577"/>
+                  <a:pt x="371" y="6900"/>
+                  <a:pt x="0" y="0"/>
+                </a:cubicBezTo>
+                <a:close/>
+              </a:path>
+            </a:pathLst>
+          </a:custGeom>
+          <a:solidFill>
+            <a:schemeClr val="accent2"/>
+          </a:solidFill>
+          <a:ln w="38100" cap="rnd">
+            <a:solidFill>
+              <a:schemeClr val="accent2"/>
+            </a:solidFill>
+            <a:round/>
+            <a:extLst>
+              <a:ext uri="{C807C97D-BFC1-408E-A445-0C87EB9F89A2}">
+                <ask:lineSketchStyleProps xmlns:ask="http://schemas.microsoft.com/office/drawing/2018/sketchyshapes" sd="1219033472">
+                  <a:prstGeom prst="rect">
+                    <a:avLst/>
+                  </a:prstGeom>
+                  <ask:type>
+                    <ask:lineSketchFreehand/>
+                  </ask:type>
+                </ask:lineSketchStyleProps>
+              </a:ext>
+            </a:extLst>
+          </a:ln>
+        </p:spPr>
+        <p:style>
+          <a:lnRef idx="2">
+            <a:schemeClr val="accent1">
+              <a:shade val="50000"/>
+            </a:schemeClr>
+          </a:lnRef>
+          <a:fillRef idx="1">
+            <a:schemeClr val="accent1"/>
+          </a:fillRef>
+          <a:effectRef idx="0">
+            <a:schemeClr val="accent1"/>
+          </a:effectRef>
+          <a:fontRef idx="minor">
+            <a:schemeClr val="lt1"/>
+          </a:fontRef>
+        </p:style>
+        <p:txBody>
+          <a:bodyPr rtlCol="0" anchor="ctr"/>
+          <a:lstStyle/>
+          <a:p>
+            <a:pPr algn="ctr"/>
+            <a:endParaRPr lang="en-US"/>
+          </a:p>
+        </p:txBody>
+      </p:sp>
+      <p:sp>
+        <p:nvSpPr>
+          <p:cNvPr id="3" name="Content Placeholder 2">
+            <a:extLst>
+              <a:ext uri="{FF2B5EF4-FFF2-40B4-BE49-F238E27FC236}">
                 <a16:creationId xmlns:a16="http://schemas.microsoft.com/office/drawing/2014/main" id="{01D1CAB9-D946-45AF-BE91-13A4A07A3DB9}"/>
               </a:ext>
             </a:extLst>
@@ -6550,18 +6985,35 @@
           <a:lstStyle/>
           <a:p>
             <a:r>
-              <a:rPr lang="en-GB" sz="2200"/>
+              <a:rPr lang="en-GB" sz="2200" dirty="0"/>
               <a:t>DERE FÅR I OPPGAVE!</a:t>
             </a:r>
           </a:p>
           <a:p>
-            <a:endParaRPr lang="en-GB" sz="2200"/>
-          </a:p>
-          <a:p>
-            <a:r>
-              <a:rPr lang="en-GB" sz="2200"/>
-              <a:t>Etterpå: Vi programmerer dette</a:t>
-            </a:r>
+            <a:endParaRPr lang="en-GB" sz="2200" dirty="0"/>
+          </a:p>
+          <a:p>
+            <a:r>
+              <a:rPr lang="en-GB" sz="2200" dirty="0" err="1"/>
+              <a:t>Etterpå</a:t>
+            </a:r>
+            <a:r>
+              <a:rPr lang="en-GB" sz="2200" dirty="0"/>
+              <a:t>: Vi </a:t>
+            </a:r>
+            <a:r>
+              <a:rPr lang="en-GB" sz="2200" dirty="0" err="1"/>
+              <a:t>programmerer</a:t>
+            </a:r>
+            <a:r>
+              <a:rPr lang="en-GB" sz="2200" dirty="0"/>
+              <a:t> </a:t>
+            </a:r>
+            <a:r>
+              <a:rPr lang="en-GB" sz="2200" dirty="0" err="1"/>
+              <a:t>dette</a:t>
+            </a:r>
+            <a:endParaRPr lang="en-GB" sz="2200" dirty="0"/>
           </a:p>
         </p:txBody>
       </p:sp>
@@ -6608,7 +7060,7 @@
 </p:sld>
 </file>
 
-<file path=ppt/slides/slide7.xml><?xml version="1.0" encoding="utf-8"?>
+<file path=ppt/slides/slide8.xml><?xml version="1.0" encoding="utf-8"?>
 <p:sld xmlns:a="http://schemas.openxmlformats.org/drawingml/2006/main" xmlns:r="http://schemas.openxmlformats.org/officeDocument/2006/relationships" xmlns:p="http://schemas.openxmlformats.org/presentationml/2006/main">
   <p:cSld>
     <p:bg>
@@ -7062,55 +7514,574 @@
         </p:spPr>
         <p:txBody>
           <a:bodyPr anchor="t">
-            <a:normAutofit/>
+            <a:normAutofit lnSpcReduction="10000"/>
           </a:bodyPr>
           <a:lstStyle/>
           <a:p>
             <a:r>
-              <a:rPr lang="en-GB" sz="1500">
+              <a:rPr lang="en-GB" sz="1500" dirty="0">
                 <a:solidFill>
                   <a:srgbClr val="FEFFFF"/>
                 </a:solidFill>
               </a:rPr>
-              <a:t>Lag algoritme for å finne ut om et binært tre ER et binært søketre (BST)! Husk vilkår for BST:</a:t>
+              <a:t>Lag </a:t>
+            </a:r>
+            <a:r>
+              <a:rPr lang="en-GB" sz="1500" dirty="0" err="1">
+                <a:solidFill>
+                  <a:srgbClr val="FEFFFF"/>
+                </a:solidFill>
+              </a:rPr>
+              <a:t>algoritme</a:t>
+            </a:r>
+            <a:r>
+              <a:rPr lang="en-GB" sz="1500" dirty="0">
+                <a:solidFill>
+                  <a:srgbClr val="FEFFFF"/>
+                </a:solidFill>
+              </a:rPr>
+              <a:t> for å </a:t>
+            </a:r>
+            <a:r>
+              <a:rPr lang="en-GB" sz="1500" dirty="0" err="1">
+                <a:solidFill>
+                  <a:srgbClr val="FEFFFF"/>
+                </a:solidFill>
+              </a:rPr>
+              <a:t>finne</a:t>
+            </a:r>
+            <a:r>
+              <a:rPr lang="en-GB" sz="1500" dirty="0">
+                <a:solidFill>
+                  <a:srgbClr val="FEFFFF"/>
+                </a:solidFill>
+              </a:rPr>
+              <a:t> </a:t>
+            </a:r>
+            <a:r>
+              <a:rPr lang="en-GB" sz="1500" dirty="0" err="1">
+                <a:solidFill>
+                  <a:srgbClr val="FEFFFF"/>
+                </a:solidFill>
+              </a:rPr>
+              <a:t>ut</a:t>
+            </a:r>
+            <a:r>
+              <a:rPr lang="en-GB" sz="1500" dirty="0">
+                <a:solidFill>
+                  <a:srgbClr val="FEFFFF"/>
+                </a:solidFill>
+              </a:rPr>
+              <a:t> om et </a:t>
+            </a:r>
+            <a:r>
+              <a:rPr lang="en-GB" sz="1500" dirty="0" err="1">
+                <a:solidFill>
+                  <a:srgbClr val="FEFFFF"/>
+                </a:solidFill>
+              </a:rPr>
+              <a:t>binært</a:t>
+            </a:r>
+            <a:r>
+              <a:rPr lang="en-GB" sz="1500" dirty="0">
+                <a:solidFill>
+                  <a:srgbClr val="FEFFFF"/>
+                </a:solidFill>
+              </a:rPr>
+              <a:t> </a:t>
+            </a:r>
+            <a:r>
+              <a:rPr lang="en-GB" sz="1500" dirty="0" err="1">
+                <a:solidFill>
+                  <a:srgbClr val="FEFFFF"/>
+                </a:solidFill>
+              </a:rPr>
+              <a:t>tre</a:t>
+            </a:r>
+            <a:r>
+              <a:rPr lang="en-GB" sz="1500" dirty="0">
+                <a:solidFill>
+                  <a:srgbClr val="FEFFFF"/>
+                </a:solidFill>
+              </a:rPr>
+              <a:t> ER et </a:t>
+            </a:r>
+            <a:r>
+              <a:rPr lang="en-GB" sz="1500" dirty="0" err="1">
+                <a:solidFill>
+                  <a:srgbClr val="FEFFFF"/>
+                </a:solidFill>
+              </a:rPr>
+              <a:t>binært</a:t>
+            </a:r>
+            <a:r>
+              <a:rPr lang="en-GB" sz="1500" dirty="0">
+                <a:solidFill>
+                  <a:srgbClr val="FEFFFF"/>
+                </a:solidFill>
+              </a:rPr>
+              <a:t> </a:t>
+            </a:r>
+            <a:r>
+              <a:rPr lang="en-GB" sz="1500" dirty="0" err="1">
+                <a:solidFill>
+                  <a:srgbClr val="FEFFFF"/>
+                </a:solidFill>
+              </a:rPr>
+              <a:t>søketre</a:t>
+            </a:r>
+            <a:r>
+              <a:rPr lang="en-GB" sz="1500" dirty="0">
+                <a:solidFill>
+                  <a:srgbClr val="FEFFFF"/>
+                </a:solidFill>
+              </a:rPr>
+              <a:t> (BST)! Husk </a:t>
+            </a:r>
+            <a:r>
+              <a:rPr lang="en-GB" sz="1500" dirty="0" err="1">
+                <a:solidFill>
+                  <a:srgbClr val="FEFFFF"/>
+                </a:solidFill>
+              </a:rPr>
+              <a:t>vilkår</a:t>
+            </a:r>
+            <a:r>
+              <a:rPr lang="en-GB" sz="1500" dirty="0">
+                <a:solidFill>
+                  <a:srgbClr val="FEFFFF"/>
+                </a:solidFill>
+              </a:rPr>
+              <a:t> for BST:</a:t>
             </a:r>
           </a:p>
           <a:p>
             <a:pPr lvl="1"/>
             <a:r>
-              <a:rPr lang="en-GB" sz="1500">
+              <a:rPr lang="en-GB" sz="1500" dirty="0">
                 <a:solidFill>
                   <a:srgbClr val="FEFFFF"/>
                 </a:solidFill>
               </a:rPr>
-              <a:t>Alle nodene i venstre subtre må være mindre enn rot-node</a:t>
+              <a:t>Alle </a:t>
+            </a:r>
+            <a:r>
+              <a:rPr lang="en-GB" sz="1500" dirty="0" err="1">
+                <a:solidFill>
+                  <a:srgbClr val="FEFFFF"/>
+                </a:solidFill>
+              </a:rPr>
+              <a:t>nodene</a:t>
+            </a:r>
+            <a:r>
+              <a:rPr lang="en-GB" sz="1500" dirty="0">
+                <a:solidFill>
+                  <a:srgbClr val="FEFFFF"/>
+                </a:solidFill>
+              </a:rPr>
+              <a:t> i </a:t>
+            </a:r>
+            <a:r>
+              <a:rPr lang="en-GB" sz="1500" dirty="0" err="1">
+                <a:solidFill>
+                  <a:srgbClr val="FEFFFF"/>
+                </a:solidFill>
+              </a:rPr>
+              <a:t>venstre</a:t>
+            </a:r>
+            <a:r>
+              <a:rPr lang="en-GB" sz="1500" dirty="0">
+                <a:solidFill>
+                  <a:srgbClr val="FEFFFF"/>
+                </a:solidFill>
+              </a:rPr>
+              <a:t> </a:t>
+            </a:r>
+            <a:r>
+              <a:rPr lang="en-GB" sz="1500" dirty="0" err="1">
+                <a:solidFill>
+                  <a:srgbClr val="FEFFFF"/>
+                </a:solidFill>
+              </a:rPr>
+              <a:t>subtre</a:t>
+            </a:r>
+            <a:r>
+              <a:rPr lang="en-GB" sz="1500" dirty="0">
+                <a:solidFill>
+                  <a:srgbClr val="FEFFFF"/>
+                </a:solidFill>
+              </a:rPr>
+              <a:t> </a:t>
+            </a:r>
+            <a:r>
+              <a:rPr lang="en-GB" sz="1500" dirty="0" err="1">
+                <a:solidFill>
+                  <a:srgbClr val="FEFFFF"/>
+                </a:solidFill>
+              </a:rPr>
+              <a:t>må</a:t>
+            </a:r>
+            <a:r>
+              <a:rPr lang="en-GB" sz="1500" dirty="0">
+                <a:solidFill>
+                  <a:srgbClr val="FEFFFF"/>
+                </a:solidFill>
+              </a:rPr>
+              <a:t> </a:t>
+            </a:r>
+            <a:r>
+              <a:rPr lang="en-GB" sz="1500" dirty="0" err="1">
+                <a:solidFill>
+                  <a:srgbClr val="FEFFFF"/>
+                </a:solidFill>
+              </a:rPr>
+              <a:t>være</a:t>
+            </a:r>
+            <a:r>
+              <a:rPr lang="en-GB" sz="1500" dirty="0">
+                <a:solidFill>
+                  <a:srgbClr val="FEFFFF"/>
+                </a:solidFill>
+              </a:rPr>
+              <a:t> </a:t>
+            </a:r>
+            <a:r>
+              <a:rPr lang="en-GB" sz="1500" dirty="0" err="1">
+                <a:solidFill>
+                  <a:srgbClr val="FEFFFF"/>
+                </a:solidFill>
+              </a:rPr>
+              <a:t>mindre</a:t>
+            </a:r>
+            <a:r>
+              <a:rPr lang="en-GB" sz="1500" dirty="0">
+                <a:solidFill>
+                  <a:srgbClr val="FEFFFF"/>
+                </a:solidFill>
+              </a:rPr>
+              <a:t> </a:t>
+            </a:r>
+            <a:r>
+              <a:rPr lang="en-GB" sz="1500" dirty="0" err="1">
+                <a:solidFill>
+                  <a:srgbClr val="FEFFFF"/>
+                </a:solidFill>
+              </a:rPr>
+              <a:t>enn</a:t>
+            </a:r>
+            <a:r>
+              <a:rPr lang="en-GB" sz="1500" dirty="0">
+                <a:solidFill>
+                  <a:srgbClr val="FEFFFF"/>
+                </a:solidFill>
+              </a:rPr>
+              <a:t> rot-node</a:t>
             </a:r>
           </a:p>
           <a:p>
             <a:pPr lvl="1"/>
             <a:r>
-              <a:rPr lang="en-GB" sz="1500">
+              <a:rPr lang="en-GB" sz="1500" dirty="0">
                 <a:solidFill>
                   <a:srgbClr val="FEFFFF"/>
                 </a:solidFill>
               </a:rPr>
-              <a:t>Alle nodene i høyre subtree må være større enn rot-node</a:t>
+              <a:t>Alle </a:t>
+            </a:r>
+            <a:r>
+              <a:rPr lang="en-GB" sz="1500" dirty="0" err="1">
+                <a:solidFill>
+                  <a:srgbClr val="FEFFFF"/>
+                </a:solidFill>
+              </a:rPr>
+              <a:t>nodene</a:t>
+            </a:r>
+            <a:r>
+              <a:rPr lang="en-GB" sz="1500" dirty="0">
+                <a:solidFill>
+                  <a:srgbClr val="FEFFFF"/>
+                </a:solidFill>
+              </a:rPr>
+              <a:t> i </a:t>
+            </a:r>
+            <a:r>
+              <a:rPr lang="en-GB" sz="1500" dirty="0" err="1">
+                <a:solidFill>
+                  <a:srgbClr val="FEFFFF"/>
+                </a:solidFill>
+              </a:rPr>
+              <a:t>høyre</a:t>
+            </a:r>
+            <a:r>
+              <a:rPr lang="en-GB" sz="1500" dirty="0">
+                <a:solidFill>
+                  <a:srgbClr val="FEFFFF"/>
+                </a:solidFill>
+              </a:rPr>
+              <a:t> subtree </a:t>
+            </a:r>
+            <a:r>
+              <a:rPr lang="en-GB" sz="1500" dirty="0" err="1">
+                <a:solidFill>
+                  <a:srgbClr val="FEFFFF"/>
+                </a:solidFill>
+              </a:rPr>
+              <a:t>må</a:t>
+            </a:r>
+            <a:r>
+              <a:rPr lang="en-GB" sz="1500" dirty="0">
+                <a:solidFill>
+                  <a:srgbClr val="FEFFFF"/>
+                </a:solidFill>
+              </a:rPr>
+              <a:t> </a:t>
+            </a:r>
+            <a:r>
+              <a:rPr lang="en-GB" sz="1500" dirty="0" err="1">
+                <a:solidFill>
+                  <a:srgbClr val="FEFFFF"/>
+                </a:solidFill>
+              </a:rPr>
+              <a:t>være</a:t>
+            </a:r>
+            <a:r>
+              <a:rPr lang="en-GB" sz="1500" dirty="0">
+                <a:solidFill>
+                  <a:srgbClr val="FEFFFF"/>
+                </a:solidFill>
+              </a:rPr>
+              <a:t> </a:t>
+            </a:r>
+            <a:r>
+              <a:rPr lang="en-GB" sz="1500" dirty="0" err="1">
+                <a:solidFill>
+                  <a:srgbClr val="FEFFFF"/>
+                </a:solidFill>
+              </a:rPr>
+              <a:t>større</a:t>
+            </a:r>
+            <a:r>
+              <a:rPr lang="en-GB" sz="1500" dirty="0">
+                <a:solidFill>
+                  <a:srgbClr val="FEFFFF"/>
+                </a:solidFill>
+              </a:rPr>
+              <a:t> </a:t>
+            </a:r>
+            <a:r>
+              <a:rPr lang="en-GB" sz="1500" dirty="0" err="1">
+                <a:solidFill>
+                  <a:srgbClr val="FEFFFF"/>
+                </a:solidFill>
+              </a:rPr>
+              <a:t>enn</a:t>
+            </a:r>
+            <a:r>
+              <a:rPr lang="en-GB" sz="1500" dirty="0">
+                <a:solidFill>
+                  <a:srgbClr val="FEFFFF"/>
+                </a:solidFill>
+              </a:rPr>
+              <a:t> rot-node</a:t>
             </a:r>
           </a:p>
           <a:p>
             <a:pPr lvl="1"/>
             <a:r>
-              <a:rPr lang="en-GB" sz="1500">
+              <a:rPr lang="en-GB" sz="1500" dirty="0" err="1">
                 <a:solidFill>
                   <a:srgbClr val="FEFFFF"/>
                 </a:solidFill>
               </a:rPr>
-              <a:t>Gjentar seg rekursivt nedover i treet</a:t>
-            </a:r>
+              <a:t>Gjentar</a:t>
+            </a:r>
+            <a:r>
+              <a:rPr lang="en-GB" sz="1500" dirty="0">
+                <a:solidFill>
+                  <a:srgbClr val="FEFFFF"/>
+                </a:solidFill>
+              </a:rPr>
+              <a:t> seg </a:t>
+            </a:r>
+            <a:r>
+              <a:rPr lang="en-GB" sz="1500" dirty="0" err="1">
+                <a:solidFill>
+                  <a:srgbClr val="FEFFFF"/>
+                </a:solidFill>
+              </a:rPr>
+              <a:t>rekursivt</a:t>
+            </a:r>
+            <a:r>
+              <a:rPr lang="en-GB" sz="1500" dirty="0">
+                <a:solidFill>
+                  <a:srgbClr val="FEFFFF"/>
+                </a:solidFill>
+              </a:rPr>
+              <a:t> </a:t>
+            </a:r>
+            <a:r>
+              <a:rPr lang="en-GB" sz="1500" dirty="0" err="1">
+                <a:solidFill>
+                  <a:srgbClr val="FEFFFF"/>
+                </a:solidFill>
+              </a:rPr>
+              <a:t>nedover</a:t>
+            </a:r>
+            <a:r>
+              <a:rPr lang="en-GB" sz="1500" dirty="0">
+                <a:solidFill>
+                  <a:srgbClr val="FEFFFF"/>
+                </a:solidFill>
+              </a:rPr>
+              <a:t> i </a:t>
+            </a:r>
+            <a:r>
+              <a:rPr lang="en-GB" sz="1500" dirty="0" err="1">
+                <a:solidFill>
+                  <a:srgbClr val="FEFFFF"/>
+                </a:solidFill>
+              </a:rPr>
+              <a:t>treet</a:t>
+            </a:r>
+            <a:endParaRPr lang="en-GB" sz="1500" dirty="0">
+              <a:solidFill>
+                <a:srgbClr val="FEFFFF"/>
+              </a:solidFill>
+            </a:endParaRPr>
           </a:p>
           <a:p>
             <a:pPr lvl="1"/>
-            <a:endParaRPr lang="en-GB" sz="1500">
+            <a:endParaRPr lang="en-GB" sz="1500" dirty="0">
+              <a:solidFill>
+                <a:srgbClr val="FEFFFF"/>
+              </a:solidFill>
+            </a:endParaRPr>
+          </a:p>
+          <a:p>
+            <a:r>
+              <a:rPr lang="en-GB" sz="1900" dirty="0">
+                <a:solidFill>
+                  <a:srgbClr val="FEFFFF"/>
+                </a:solidFill>
+              </a:rPr>
+              <a:t>HINT: </a:t>
+            </a:r>
+            <a:r>
+              <a:rPr lang="en-GB" sz="1900" dirty="0" err="1">
+                <a:solidFill>
+                  <a:srgbClr val="FEFFFF"/>
+                </a:solidFill>
+              </a:rPr>
+              <a:t>Hvilke</a:t>
+            </a:r>
+            <a:r>
+              <a:rPr lang="en-GB" sz="1900" dirty="0">
+                <a:solidFill>
+                  <a:srgbClr val="FEFFFF"/>
+                </a:solidFill>
+              </a:rPr>
+              <a:t> fire </a:t>
+            </a:r>
+            <a:r>
+              <a:rPr lang="en-GB" sz="1900" dirty="0" err="1">
+                <a:solidFill>
+                  <a:srgbClr val="FEFFFF"/>
+                </a:solidFill>
+              </a:rPr>
+              <a:t>kriterier</a:t>
+            </a:r>
+            <a:r>
+              <a:rPr lang="en-GB" sz="1900" dirty="0">
+                <a:solidFill>
+                  <a:srgbClr val="FEFFFF"/>
+                </a:solidFill>
+              </a:rPr>
+              <a:t> </a:t>
+            </a:r>
+            <a:r>
+              <a:rPr lang="en-GB" sz="1900" dirty="0" err="1">
+                <a:solidFill>
+                  <a:srgbClr val="FEFFFF"/>
+                </a:solidFill>
+              </a:rPr>
+              <a:t>må</a:t>
+            </a:r>
+            <a:r>
+              <a:rPr lang="en-GB" sz="1900" dirty="0">
+                <a:solidFill>
+                  <a:srgbClr val="FEFFFF"/>
+                </a:solidFill>
+              </a:rPr>
+              <a:t> </a:t>
+            </a:r>
+            <a:r>
+              <a:rPr lang="en-GB" sz="1900" dirty="0" err="1">
+                <a:solidFill>
+                  <a:srgbClr val="FEFFFF"/>
+                </a:solidFill>
+              </a:rPr>
+              <a:t>oppfylles</a:t>
+            </a:r>
+            <a:r>
+              <a:rPr lang="en-GB" sz="1900" dirty="0">
+                <a:solidFill>
+                  <a:srgbClr val="FEFFFF"/>
+                </a:solidFill>
+              </a:rPr>
+              <a:t> </a:t>
+            </a:r>
+            <a:r>
+              <a:rPr lang="en-GB" sz="1900" dirty="0" err="1">
+                <a:solidFill>
+                  <a:srgbClr val="FEFFFF"/>
+                </a:solidFill>
+              </a:rPr>
+              <a:t>på</a:t>
+            </a:r>
+            <a:r>
+              <a:rPr lang="en-GB" sz="1900" dirty="0">
+                <a:solidFill>
+                  <a:srgbClr val="FEFFFF"/>
+                </a:solidFill>
+              </a:rPr>
+              <a:t> </a:t>
+            </a:r>
+            <a:r>
+              <a:rPr lang="en-GB" sz="1900" dirty="0" err="1">
+                <a:solidFill>
+                  <a:srgbClr val="FEFFFF"/>
+                </a:solidFill>
+              </a:rPr>
+              <a:t>hvert</a:t>
+            </a:r>
+            <a:r>
+              <a:rPr lang="en-GB" sz="1900" dirty="0">
+                <a:solidFill>
+                  <a:srgbClr val="FEFFFF"/>
+                </a:solidFill>
+              </a:rPr>
+              <a:t> </a:t>
+            </a:r>
+            <a:r>
+              <a:rPr lang="en-GB" sz="1900" dirty="0" err="1">
+                <a:solidFill>
+                  <a:srgbClr val="FEFFFF"/>
+                </a:solidFill>
+              </a:rPr>
+              <a:t>nivå</a:t>
+            </a:r>
+            <a:r>
+              <a:rPr lang="en-GB" sz="1900" dirty="0">
+                <a:solidFill>
+                  <a:srgbClr val="FEFFFF"/>
+                </a:solidFill>
+              </a:rPr>
+              <a:t>?</a:t>
+            </a:r>
+          </a:p>
+          <a:p>
+            <a:pPr lvl="1"/>
+            <a:endParaRPr lang="en-GB" sz="1500" dirty="0">
               <a:solidFill>
                 <a:srgbClr val="FEFFFF"/>
               </a:solidFill>

</xml_diff>